<commit_message>
small improvements to the powerpoint
</commit_message>
<xml_diff>
--- a/Classification Project.pptx
+++ b/Classification Project.pptx
@@ -273,7 +273,7 @@
       </p15:sldGuideLst>
     </p:ext>
     <p:ext uri="http://customooxmlschemas.google.com/">
-      <go:slidesCustomData xmlns:go="http://customooxmlschemas.google.com/" xmlns:ahyp="http://schemas.microsoft.com/office/drawing/2018/hyperlinkcolor" xmlns:p15="http://schemas.microsoft.com/office/powerpoint/2012/main" xmlns:p14="http://schemas.microsoft.com/office/powerpoint/2010/main" xmlns:com="http://schemas.openxmlformats.org/drawingml/2006/compatibility" xmlns:pvml="urn:schemas-microsoft-com:office:powerpoint" xmlns:v="urn:schemas-microsoft-com:vml" xmlns:o="urn:schemas-microsoft-com:office:office" xmlns:dgm="http://schemas.openxmlformats.org/drawingml/2006/diagram" xmlns:c="http://schemas.openxmlformats.org/drawingml/2006/chart" xmlns:mv="urn:schemas-microsoft-com:mac:vml" xmlns:mc="http://schemas.openxmlformats.org/markup-compatibility/2006" xmlns="" r:id="rId36" roundtripDataSignature="AMtx7miGgDoiva4z+C+cfK004YbnB/8VVQ=="/>
+      <go:slidesCustomData xmlns="" xmlns:mc="http://schemas.openxmlformats.org/markup-compatibility/2006" xmlns:mv="urn:schemas-microsoft-com:mac:vml" xmlns:c="http://schemas.openxmlformats.org/drawingml/2006/chart" xmlns:dgm="http://schemas.openxmlformats.org/drawingml/2006/diagram" xmlns:o="urn:schemas-microsoft-com:office:office" xmlns:v="urn:schemas-microsoft-com:vml" xmlns:pvml="urn:schemas-microsoft-com:office:powerpoint" xmlns:com="http://schemas.openxmlformats.org/drawingml/2006/compatibility" xmlns:p14="http://schemas.microsoft.com/office/powerpoint/2010/main" xmlns:p15="http://schemas.microsoft.com/office/powerpoint/2012/main" xmlns:ahyp="http://schemas.microsoft.com/office/drawing/2018/hyperlinkcolor" xmlns:go="http://customooxmlschemas.google.com/" r:id="rId36" roundtripDataSignature="AMtx7miGgDoiva4z+C+cfK004YbnB/8VVQ=="/>
     </p:ext>
   </p:extLst>
 </p:presentation>
@@ -14726,7 +14726,7 @@
         </p:blipFill>
         <p:spPr>
           <a:xfrm>
-            <a:off x="3394444" y="435083"/>
+            <a:off x="3350537" y="424808"/>
             <a:ext cx="8391525" cy="4724400"/>
           </a:xfrm>
           <a:prstGeom prst="rect">
@@ -15020,6 +15020,330 @@
               <a:rPr lang="en-US" sz="3600" dirty="0"/>
               <a:t>Using grid search with 5-fold cv  </a:t>
             </a:r>
+          </a:p>
+        </p:txBody>
+      </p:sp>
+      <p:sp>
+        <p:nvSpPr>
+          <p:cNvPr id="2" name="Rectangle 1">
+            <a:extLst>
+              <a:ext uri="{FF2B5EF4-FFF2-40B4-BE49-F238E27FC236}">
+                <a16:creationId xmlns:a16="http://schemas.microsoft.com/office/drawing/2014/main" id="{2178418D-4EF1-4812-A9F9-996D86A599AF}"/>
+              </a:ext>
+            </a:extLst>
+          </p:cNvPr>
+          <p:cNvSpPr/>
+          <p:nvPr/>
+        </p:nvSpPr>
+        <p:spPr>
+          <a:xfrm>
+            <a:off x="6044792" y="4119936"/>
+            <a:ext cx="921251" cy="472612"/>
+          </a:xfrm>
+          <a:prstGeom prst="rect">
+            <a:avLst/>
+          </a:prstGeom>
+          <a:solidFill>
+            <a:srgbClr val="38A117">
+              <a:alpha val="40000"/>
+            </a:srgbClr>
+          </a:solidFill>
+          <a:ln>
+            <a:noFill/>
+          </a:ln>
+        </p:spPr>
+        <p:style>
+          <a:lnRef idx="2">
+            <a:schemeClr val="accent1">
+              <a:shade val="50000"/>
+            </a:schemeClr>
+          </a:lnRef>
+          <a:fillRef idx="1">
+            <a:schemeClr val="accent1"/>
+          </a:fillRef>
+          <a:effectRef idx="0">
+            <a:schemeClr val="accent1"/>
+          </a:effectRef>
+          <a:fontRef idx="minor">
+            <a:schemeClr val="lt1"/>
+          </a:fontRef>
+        </p:style>
+        <p:txBody>
+          <a:bodyPr rtlCol="0" anchor="ctr"/>
+          <a:lstStyle/>
+          <a:p>
+            <a:pPr algn="ctr"/>
+            <a:endParaRPr lang="en-IL"/>
+          </a:p>
+        </p:txBody>
+      </p:sp>
+      <p:sp>
+        <p:nvSpPr>
+          <p:cNvPr id="9" name="Rectangle 8">
+            <a:extLst>
+              <a:ext uri="{FF2B5EF4-FFF2-40B4-BE49-F238E27FC236}">
+                <a16:creationId xmlns:a16="http://schemas.microsoft.com/office/drawing/2014/main" id="{899D95CA-C6A2-459F-A02A-68F15D51EB6E}"/>
+              </a:ext>
+            </a:extLst>
+          </p:cNvPr>
+          <p:cNvSpPr/>
+          <p:nvPr/>
+        </p:nvSpPr>
+        <p:spPr>
+          <a:xfrm>
+            <a:off x="7173907" y="4119936"/>
+            <a:ext cx="921251" cy="472612"/>
+          </a:xfrm>
+          <a:prstGeom prst="rect">
+            <a:avLst/>
+          </a:prstGeom>
+          <a:solidFill>
+            <a:srgbClr val="38A117">
+              <a:alpha val="40000"/>
+            </a:srgbClr>
+          </a:solidFill>
+          <a:ln>
+            <a:noFill/>
+          </a:ln>
+        </p:spPr>
+        <p:style>
+          <a:lnRef idx="2">
+            <a:schemeClr val="accent1">
+              <a:shade val="50000"/>
+            </a:schemeClr>
+          </a:lnRef>
+          <a:fillRef idx="1">
+            <a:schemeClr val="accent1"/>
+          </a:fillRef>
+          <a:effectRef idx="0">
+            <a:schemeClr val="accent1"/>
+          </a:effectRef>
+          <a:fontRef idx="minor">
+            <a:schemeClr val="lt1"/>
+          </a:fontRef>
+        </p:style>
+        <p:txBody>
+          <a:bodyPr rtlCol="0" anchor="ctr"/>
+          <a:lstStyle/>
+          <a:p>
+            <a:pPr algn="ctr"/>
+            <a:endParaRPr lang="en-IL"/>
+          </a:p>
+        </p:txBody>
+      </p:sp>
+      <p:sp>
+        <p:nvSpPr>
+          <p:cNvPr id="10" name="Rectangle 9">
+            <a:extLst>
+              <a:ext uri="{FF2B5EF4-FFF2-40B4-BE49-F238E27FC236}">
+                <a16:creationId xmlns:a16="http://schemas.microsoft.com/office/drawing/2014/main" id="{AC2538FE-2A4F-48DD-81B9-35AC624D1B37}"/>
+              </a:ext>
+            </a:extLst>
+          </p:cNvPr>
+          <p:cNvSpPr/>
+          <p:nvPr/>
+        </p:nvSpPr>
+        <p:spPr>
+          <a:xfrm>
+            <a:off x="8367315" y="2787008"/>
+            <a:ext cx="921251" cy="472612"/>
+          </a:xfrm>
+          <a:prstGeom prst="rect">
+            <a:avLst/>
+          </a:prstGeom>
+          <a:solidFill>
+            <a:srgbClr val="38A117">
+              <a:alpha val="40000"/>
+            </a:srgbClr>
+          </a:solidFill>
+          <a:ln>
+            <a:noFill/>
+          </a:ln>
+        </p:spPr>
+        <p:style>
+          <a:lnRef idx="2">
+            <a:schemeClr val="accent1">
+              <a:shade val="50000"/>
+            </a:schemeClr>
+          </a:lnRef>
+          <a:fillRef idx="1">
+            <a:schemeClr val="accent1"/>
+          </a:fillRef>
+          <a:effectRef idx="0">
+            <a:schemeClr val="accent1"/>
+          </a:effectRef>
+          <a:fontRef idx="minor">
+            <a:schemeClr val="lt1"/>
+          </a:fontRef>
+        </p:style>
+        <p:txBody>
+          <a:bodyPr rtlCol="0" anchor="ctr"/>
+          <a:lstStyle/>
+          <a:p>
+            <a:pPr algn="ctr"/>
+            <a:endParaRPr lang="en-IL"/>
+          </a:p>
+        </p:txBody>
+      </p:sp>
+      <p:sp>
+        <p:nvSpPr>
+          <p:cNvPr id="11" name="Rectangle 10">
+            <a:extLst>
+              <a:ext uri="{FF2B5EF4-FFF2-40B4-BE49-F238E27FC236}">
+                <a16:creationId xmlns:a16="http://schemas.microsoft.com/office/drawing/2014/main" id="{8D99D160-0A07-445C-9A2D-14CF093A8B2E}"/>
+              </a:ext>
+            </a:extLst>
+          </p:cNvPr>
+          <p:cNvSpPr/>
+          <p:nvPr/>
+        </p:nvSpPr>
+        <p:spPr>
+          <a:xfrm>
+            <a:off x="9454113" y="4119936"/>
+            <a:ext cx="921251" cy="472612"/>
+          </a:xfrm>
+          <a:prstGeom prst="rect">
+            <a:avLst/>
+          </a:prstGeom>
+          <a:solidFill>
+            <a:srgbClr val="38A117">
+              <a:alpha val="40000"/>
+            </a:srgbClr>
+          </a:solidFill>
+          <a:ln>
+            <a:noFill/>
+          </a:ln>
+        </p:spPr>
+        <p:style>
+          <a:lnRef idx="2">
+            <a:schemeClr val="accent1">
+              <a:shade val="50000"/>
+            </a:schemeClr>
+          </a:lnRef>
+          <a:fillRef idx="1">
+            <a:schemeClr val="accent1"/>
+          </a:fillRef>
+          <a:effectRef idx="0">
+            <a:schemeClr val="accent1"/>
+          </a:effectRef>
+          <a:fontRef idx="minor">
+            <a:schemeClr val="lt1"/>
+          </a:fontRef>
+        </p:style>
+        <p:txBody>
+          <a:bodyPr rtlCol="0" anchor="ctr"/>
+          <a:lstStyle/>
+          <a:p>
+            <a:pPr algn="ctr"/>
+            <a:endParaRPr lang="en-IL"/>
+          </a:p>
+        </p:txBody>
+      </p:sp>
+      <p:sp>
+        <p:nvSpPr>
+          <p:cNvPr id="12" name="Rectangle 11">
+            <a:extLst>
+              <a:ext uri="{FF2B5EF4-FFF2-40B4-BE49-F238E27FC236}">
+                <a16:creationId xmlns:a16="http://schemas.microsoft.com/office/drawing/2014/main" id="{8BB7DB76-8C10-4FEB-8C16-CAAAFA516CE3}"/>
+              </a:ext>
+            </a:extLst>
+          </p:cNvPr>
+          <p:cNvSpPr/>
+          <p:nvPr/>
+        </p:nvSpPr>
+        <p:spPr>
+          <a:xfrm>
+            <a:off x="9454114" y="4561726"/>
+            <a:ext cx="921251" cy="472612"/>
+          </a:xfrm>
+          <a:prstGeom prst="rect">
+            <a:avLst/>
+          </a:prstGeom>
+          <a:solidFill>
+            <a:srgbClr val="38A117">
+              <a:alpha val="40000"/>
+            </a:srgbClr>
+          </a:solidFill>
+          <a:ln>
+            <a:noFill/>
+          </a:ln>
+        </p:spPr>
+        <p:style>
+          <a:lnRef idx="2">
+            <a:schemeClr val="accent1">
+              <a:shade val="50000"/>
+            </a:schemeClr>
+          </a:lnRef>
+          <a:fillRef idx="1">
+            <a:schemeClr val="accent1"/>
+          </a:fillRef>
+          <a:effectRef idx="0">
+            <a:schemeClr val="accent1"/>
+          </a:effectRef>
+          <a:fontRef idx="minor">
+            <a:schemeClr val="lt1"/>
+          </a:fontRef>
+        </p:style>
+        <p:txBody>
+          <a:bodyPr rtlCol="0" anchor="ctr"/>
+          <a:lstStyle/>
+          <a:p>
+            <a:pPr algn="ctr"/>
+            <a:endParaRPr lang="en-IL"/>
+          </a:p>
+        </p:txBody>
+      </p:sp>
+      <p:sp>
+        <p:nvSpPr>
+          <p:cNvPr id="14" name="Rectangle 13">
+            <a:extLst>
+              <a:ext uri="{FF2B5EF4-FFF2-40B4-BE49-F238E27FC236}">
+                <a16:creationId xmlns:a16="http://schemas.microsoft.com/office/drawing/2014/main" id="{48B3664F-340C-46CB-BF0C-D50A4F541C27}"/>
+              </a:ext>
+            </a:extLst>
+          </p:cNvPr>
+          <p:cNvSpPr/>
+          <p:nvPr/>
+        </p:nvSpPr>
+        <p:spPr>
+          <a:xfrm>
+            <a:off x="10652502" y="4109662"/>
+            <a:ext cx="921251" cy="472612"/>
+          </a:xfrm>
+          <a:prstGeom prst="rect">
+            <a:avLst/>
+          </a:prstGeom>
+          <a:solidFill>
+            <a:srgbClr val="38A117">
+              <a:alpha val="40000"/>
+            </a:srgbClr>
+          </a:solidFill>
+          <a:ln>
+            <a:noFill/>
+          </a:ln>
+        </p:spPr>
+        <p:style>
+          <a:lnRef idx="2">
+            <a:schemeClr val="accent1">
+              <a:shade val="50000"/>
+            </a:schemeClr>
+          </a:lnRef>
+          <a:fillRef idx="1">
+            <a:schemeClr val="accent1"/>
+          </a:fillRef>
+          <a:effectRef idx="0">
+            <a:schemeClr val="accent1"/>
+          </a:effectRef>
+          <a:fontRef idx="minor">
+            <a:schemeClr val="lt1"/>
+          </a:fontRef>
+        </p:style>
+        <p:txBody>
+          <a:bodyPr rtlCol="0" anchor="ctr"/>
+          <a:lstStyle/>
+          <a:p>
+            <a:pPr algn="ctr"/>
+            <a:endParaRPr lang="en-IL"/>
           </a:p>
         </p:txBody>
       </p:sp>
@@ -16032,7 +16356,7 @@
         </p:nvSpPr>
         <p:spPr>
           <a:xfrm>
-            <a:off x="318653" y="124979"/>
+            <a:off x="1011671" y="124979"/>
             <a:ext cx="9906002" cy="678585"/>
           </a:xfrm>
           <a:prstGeom prst="rect">
@@ -16049,7 +16373,7 @@
           </a:bodyPr>
           <a:lstStyle/>
           <a:p>
-            <a:pPr marL="0" lvl="0" indent="0" algn="l" rtl="0">
+            <a:pPr marL="0" lvl="0" indent="0" algn="ctr" rtl="0">
               <a:lnSpc>
                 <a:spcPct val="90000"/>
               </a:lnSpc>
@@ -16142,7 +16466,7 @@
         </p:blipFill>
         <p:spPr>
           <a:xfrm>
-            <a:off x="318653" y="803564"/>
+            <a:off x="2488489" y="803564"/>
             <a:ext cx="7215022" cy="5802129"/>
           </a:xfrm>
           <a:prstGeom prst="rect">

</xml_diff>

<commit_message>
updated the pipeline, smote is not used on test, bad practice
</commit_message>
<xml_diff>
--- a/Classification Project.pptx
+++ b/Classification Project.pptx
@@ -5,7 +5,7 @@
     <p:sldMasterId id="2147483648" r:id="rId1"/>
   </p:sldMasterIdLst>
   <p:notesMasterIdLst>
-    <p:notesMasterId r:id="rId19"/>
+    <p:notesMasterId r:id="rId21"/>
   </p:notesMasterIdLst>
   <p:sldIdLst>
     <p:sldId id="256" r:id="rId2"/>
@@ -18,13 +18,15 @@
     <p:sldId id="269" r:id="rId9"/>
     <p:sldId id="286" r:id="rId10"/>
     <p:sldId id="271" r:id="rId11"/>
-    <p:sldId id="293" r:id="rId12"/>
-    <p:sldId id="294" r:id="rId13"/>
-    <p:sldId id="292" r:id="rId14"/>
-    <p:sldId id="291" r:id="rId15"/>
-    <p:sldId id="282" r:id="rId16"/>
-    <p:sldId id="283" r:id="rId17"/>
-    <p:sldId id="284" r:id="rId18"/>
+    <p:sldId id="296" r:id="rId12"/>
+    <p:sldId id="295" r:id="rId13"/>
+    <p:sldId id="293" r:id="rId14"/>
+    <p:sldId id="294" r:id="rId15"/>
+    <p:sldId id="292" r:id="rId16"/>
+    <p:sldId id="291" r:id="rId17"/>
+    <p:sldId id="282" r:id="rId18"/>
+    <p:sldId id="283" r:id="rId19"/>
+    <p:sldId id="284" r:id="rId20"/>
   </p:sldIdLst>
   <p:sldSz cx="12192000" cy="6858000"/>
   <p:notesSz cx="6858000" cy="9144000"/>
@@ -273,7 +275,7 @@
       </p15:sldGuideLst>
     </p:ext>
     <p:ext uri="http://customooxmlschemas.google.com/">
-      <go:slidesCustomData xmlns="" xmlns:mc="http://schemas.openxmlformats.org/markup-compatibility/2006" xmlns:mv="urn:schemas-microsoft-com:mac:vml" xmlns:c="http://schemas.openxmlformats.org/drawingml/2006/chart" xmlns:dgm="http://schemas.openxmlformats.org/drawingml/2006/diagram" xmlns:o="urn:schemas-microsoft-com:office:office" xmlns:v="urn:schemas-microsoft-com:vml" xmlns:pvml="urn:schemas-microsoft-com:office:powerpoint" xmlns:com="http://schemas.openxmlformats.org/drawingml/2006/compatibility" xmlns:p14="http://schemas.microsoft.com/office/powerpoint/2010/main" xmlns:p15="http://schemas.microsoft.com/office/powerpoint/2012/main" xmlns:ahyp="http://schemas.microsoft.com/office/drawing/2018/hyperlinkcolor" xmlns:go="http://customooxmlschemas.google.com/" r:id="rId36" roundtripDataSignature="AMtx7miGgDoiva4z+C+cfK004YbnB/8VVQ=="/>
+      <go:slidesCustomData xmlns:go="http://customooxmlschemas.google.com/" xmlns:ahyp="http://schemas.microsoft.com/office/drawing/2018/hyperlinkcolor" xmlns:p15="http://schemas.microsoft.com/office/powerpoint/2012/main" xmlns:p14="http://schemas.microsoft.com/office/powerpoint/2010/main" xmlns:com="http://schemas.openxmlformats.org/drawingml/2006/compatibility" xmlns:pvml="urn:schemas-microsoft-com:office:powerpoint" xmlns:v="urn:schemas-microsoft-com:vml" xmlns:o="urn:schemas-microsoft-com:office:office" xmlns:dgm="http://schemas.openxmlformats.org/drawingml/2006/diagram" xmlns:c="http://schemas.openxmlformats.org/drawingml/2006/chart" xmlns:mv="urn:schemas-microsoft-com:mac:vml" xmlns:mc="http://schemas.openxmlformats.org/markup-compatibility/2006" xmlns="" r:id="rId36" roundtripDataSignature="AMtx7miGgDoiva4z+C+cfK004YbnB/8VVQ=="/>
     </p:ext>
   </p:extLst>
 </p:presentation>
@@ -1685,6 +1687,224 @@
   <p:cSld>
     <p:spTree>
       <p:nvGrpSpPr>
+        <p:cNvPr id="1" name="Shape 260"/>
+        <p:cNvGrpSpPr/>
+        <p:nvPr/>
+      </p:nvGrpSpPr>
+      <p:grpSpPr>
+        <a:xfrm>
+          <a:off x="0" y="0"/>
+          <a:ext cx="0" cy="0"/>
+          <a:chOff x="0" y="0"/>
+          <a:chExt cx="0" cy="0"/>
+        </a:xfrm>
+      </p:grpSpPr>
+      <p:sp>
+        <p:nvSpPr>
+          <p:cNvPr id="261" name="Google Shape;261;p16:notes"/>
+          <p:cNvSpPr txBox="1">
+            <a:spLocks noGrp="1"/>
+          </p:cNvSpPr>
+          <p:nvPr>
+            <p:ph type="body" idx="1"/>
+          </p:nvPr>
+        </p:nvSpPr>
+        <p:spPr>
+          <a:xfrm>
+            <a:off x="685800" y="4400550"/>
+            <a:ext cx="5486400" cy="3600450"/>
+          </a:xfrm>
+          <a:prstGeom prst="rect">
+            <a:avLst/>
+          </a:prstGeom>
+        </p:spPr>
+        <p:txBody>
+          <a:bodyPr spcFirstLastPara="1" wrap="square" lIns="91425" tIns="45700" rIns="91425" bIns="45700" anchor="t" anchorCtr="0">
+            <a:noAutofit/>
+          </a:bodyPr>
+          <a:lstStyle/>
+          <a:p>
+            <a:pPr marL="0" lvl="0" indent="0" algn="l" rtl="0">
+              <a:spcBef>
+                <a:spcPts val="0"/>
+              </a:spcBef>
+              <a:spcAft>
+                <a:spcPts val="0"/>
+              </a:spcAft>
+              <a:buNone/>
+            </a:pPr>
+            <a:endParaRPr/>
+          </a:p>
+        </p:txBody>
+      </p:sp>
+      <p:sp>
+        <p:nvSpPr>
+          <p:cNvPr id="262" name="Google Shape;262;p16:notes"/>
+          <p:cNvSpPr>
+            <a:spLocks noGrp="1" noRot="1" noChangeAspect="1"/>
+          </p:cNvSpPr>
+          <p:nvPr>
+            <p:ph type="sldImg" idx="2"/>
+          </p:nvPr>
+        </p:nvSpPr>
+        <p:spPr>
+          <a:xfrm>
+            <a:off x="685800" y="1143000"/>
+            <a:ext cx="5486400" cy="3086100"/>
+          </a:xfrm>
+          <a:custGeom>
+            <a:avLst/>
+            <a:gdLst/>
+            <a:ahLst/>
+            <a:cxnLst/>
+            <a:rect l="l" t="t" r="r" b="b"/>
+            <a:pathLst>
+              <a:path w="120000" h="120000" extrusionOk="0">
+                <a:moveTo>
+                  <a:pt x="0" y="0"/>
+                </a:moveTo>
+                <a:lnTo>
+                  <a:pt x="120000" y="0"/>
+                </a:lnTo>
+                <a:lnTo>
+                  <a:pt x="120000" y="120000"/>
+                </a:lnTo>
+                <a:lnTo>
+                  <a:pt x="0" y="120000"/>
+                </a:lnTo>
+                <a:close/>
+              </a:path>
+            </a:pathLst>
+          </a:custGeom>
+        </p:spPr>
+      </p:sp>
+    </p:spTree>
+    <p:extLst>
+      <p:ext uri="{BB962C8B-B14F-4D97-AF65-F5344CB8AC3E}">
+        <p14:creationId xmlns:p14="http://schemas.microsoft.com/office/powerpoint/2010/main" val="3578108153"/>
+      </p:ext>
+    </p:extLst>
+  </p:cSld>
+  <p:clrMapOvr>
+    <a:masterClrMapping/>
+  </p:clrMapOvr>
+</p:notes>
+</file>
+
+<file path=ppt/notesSlides/notesSlide12.xml><?xml version="1.0" encoding="utf-8"?>
+<p:notes xmlns:a="http://schemas.openxmlformats.org/drawingml/2006/main" xmlns:r="http://schemas.openxmlformats.org/officeDocument/2006/relationships" xmlns:p="http://schemas.openxmlformats.org/presentationml/2006/main" showMasterSp="0" showMasterPhAnim="0">
+  <p:cSld>
+    <p:spTree>
+      <p:nvGrpSpPr>
+        <p:cNvPr id="1" name="Shape 115"/>
+        <p:cNvGrpSpPr/>
+        <p:nvPr/>
+      </p:nvGrpSpPr>
+      <p:grpSpPr>
+        <a:xfrm>
+          <a:off x="0" y="0"/>
+          <a:ext cx="0" cy="0"/>
+          <a:chOff x="0" y="0"/>
+          <a:chExt cx="0" cy="0"/>
+        </a:xfrm>
+      </p:grpSpPr>
+      <p:sp>
+        <p:nvSpPr>
+          <p:cNvPr id="116" name="Google Shape;116;p4:notes"/>
+          <p:cNvSpPr txBox="1">
+            <a:spLocks noGrp="1"/>
+          </p:cNvSpPr>
+          <p:nvPr>
+            <p:ph type="body" idx="1"/>
+          </p:nvPr>
+        </p:nvSpPr>
+        <p:spPr>
+          <a:xfrm>
+            <a:off x="685800" y="4400550"/>
+            <a:ext cx="5486400" cy="3600450"/>
+          </a:xfrm>
+          <a:prstGeom prst="rect">
+            <a:avLst/>
+          </a:prstGeom>
+        </p:spPr>
+        <p:txBody>
+          <a:bodyPr spcFirstLastPara="1" wrap="square" lIns="91425" tIns="45700" rIns="91425" bIns="45700" anchor="t" anchorCtr="0">
+            <a:noAutofit/>
+          </a:bodyPr>
+          <a:lstStyle/>
+          <a:p>
+            <a:pPr marL="0" lvl="0" indent="0" algn="l" rtl="0">
+              <a:spcBef>
+                <a:spcPts val="0"/>
+              </a:spcBef>
+              <a:spcAft>
+                <a:spcPts val="0"/>
+              </a:spcAft>
+              <a:buNone/>
+            </a:pPr>
+            <a:endParaRPr/>
+          </a:p>
+        </p:txBody>
+      </p:sp>
+      <p:sp>
+        <p:nvSpPr>
+          <p:cNvPr id="117" name="Google Shape;117;p4:notes"/>
+          <p:cNvSpPr>
+            <a:spLocks noGrp="1" noRot="1" noChangeAspect="1"/>
+          </p:cNvSpPr>
+          <p:nvPr>
+            <p:ph type="sldImg" idx="2"/>
+          </p:nvPr>
+        </p:nvSpPr>
+        <p:spPr>
+          <a:xfrm>
+            <a:off x="685800" y="1143000"/>
+            <a:ext cx="5486400" cy="3086100"/>
+          </a:xfrm>
+          <a:custGeom>
+            <a:avLst/>
+            <a:gdLst/>
+            <a:ahLst/>
+            <a:cxnLst/>
+            <a:rect l="l" t="t" r="r" b="b"/>
+            <a:pathLst>
+              <a:path w="120000" h="120000" extrusionOk="0">
+                <a:moveTo>
+                  <a:pt x="0" y="0"/>
+                </a:moveTo>
+                <a:lnTo>
+                  <a:pt x="120000" y="0"/>
+                </a:lnTo>
+                <a:lnTo>
+                  <a:pt x="120000" y="120000"/>
+                </a:lnTo>
+                <a:lnTo>
+                  <a:pt x="0" y="120000"/>
+                </a:lnTo>
+                <a:close/>
+              </a:path>
+            </a:pathLst>
+          </a:custGeom>
+        </p:spPr>
+      </p:sp>
+    </p:spTree>
+    <p:extLst>
+      <p:ext uri="{BB962C8B-B14F-4D97-AF65-F5344CB8AC3E}">
+        <p14:creationId xmlns:p14="http://schemas.microsoft.com/office/powerpoint/2010/main" val="2043772478"/>
+      </p:ext>
+    </p:extLst>
+  </p:cSld>
+  <p:clrMapOvr>
+    <a:masterClrMapping/>
+  </p:clrMapOvr>
+</p:notes>
+</file>
+
+<file path=ppt/notesSlides/notesSlide13.xml><?xml version="1.0" encoding="utf-8"?>
+<p:notes xmlns:a="http://schemas.openxmlformats.org/drawingml/2006/main" xmlns:r="http://schemas.openxmlformats.org/officeDocument/2006/relationships" xmlns:p="http://schemas.openxmlformats.org/presentationml/2006/main" showMasterSp="0" showMasterPhAnim="0">
+  <p:cSld>
+    <p:spTree>
+      <p:nvGrpSpPr>
         <p:cNvPr id="1" name="Shape 241"/>
         <p:cNvGrpSpPr/>
         <p:nvPr/>
@@ -1789,7 +2009,7 @@
 </p:notes>
 </file>
 
-<file path=ppt/notesSlides/notesSlide12.xml><?xml version="1.0" encoding="utf-8"?>
+<file path=ppt/notesSlides/notesSlide14.xml><?xml version="1.0" encoding="utf-8"?>
 <p:notes xmlns:a="http://schemas.openxmlformats.org/drawingml/2006/main" xmlns:r="http://schemas.openxmlformats.org/officeDocument/2006/relationships" xmlns:p="http://schemas.openxmlformats.org/presentationml/2006/main" showMasterSp="0" showMasterPhAnim="0">
   <p:cSld>
     <p:spTree>
@@ -1898,7 +2118,7 @@
 </p:notes>
 </file>
 
-<file path=ppt/notesSlides/notesSlide13.xml><?xml version="1.0" encoding="utf-8"?>
+<file path=ppt/notesSlides/notesSlide15.xml><?xml version="1.0" encoding="utf-8"?>
 <p:notes xmlns:a="http://schemas.openxmlformats.org/drawingml/2006/main" xmlns:r="http://schemas.openxmlformats.org/officeDocument/2006/relationships" xmlns:p="http://schemas.openxmlformats.org/presentationml/2006/main" showMasterSp="0" showMasterPhAnim="0">
   <p:cSld>
     <p:spTree>
@@ -2007,7 +2227,7 @@
 </p:notes>
 </file>
 
-<file path=ppt/notesSlides/notesSlide14.xml><?xml version="1.0" encoding="utf-8"?>
+<file path=ppt/notesSlides/notesSlide16.xml><?xml version="1.0" encoding="utf-8"?>
 <p:notes xmlns:a="http://schemas.openxmlformats.org/drawingml/2006/main" xmlns:r="http://schemas.openxmlformats.org/officeDocument/2006/relationships" xmlns:p="http://schemas.openxmlformats.org/presentationml/2006/main" showMasterSp="0" showMasterPhAnim="0">
   <p:cSld>
     <p:spTree>
@@ -2116,7 +2336,7 @@
 </p:notes>
 </file>
 
-<file path=ppt/notesSlides/notesSlide15.xml><?xml version="1.0" encoding="utf-8"?>
+<file path=ppt/notesSlides/notesSlide17.xml><?xml version="1.0" encoding="utf-8"?>
 <p:notes xmlns:a="http://schemas.openxmlformats.org/drawingml/2006/main" xmlns:r="http://schemas.openxmlformats.org/officeDocument/2006/relationships" xmlns:p="http://schemas.openxmlformats.org/presentationml/2006/main" showMasterSp="0" showMasterPhAnim="0">
   <p:cSld>
     <p:spTree>
@@ -2220,7 +2440,7 @@
 </p:notes>
 </file>
 
-<file path=ppt/notesSlides/notesSlide16.xml><?xml version="1.0" encoding="utf-8"?>
+<file path=ppt/notesSlides/notesSlide18.xml><?xml version="1.0" encoding="utf-8"?>
 <p:notes xmlns:a="http://schemas.openxmlformats.org/drawingml/2006/main" xmlns:r="http://schemas.openxmlformats.org/officeDocument/2006/relationships" xmlns:p="http://schemas.openxmlformats.org/presentationml/2006/main" showMasterSp="0" showMasterPhAnim="0">
   <p:cSld>
     <p:spTree>
@@ -2324,7 +2544,7 @@
 </p:notes>
 </file>
 
-<file path=ppt/notesSlides/notesSlide17.xml><?xml version="1.0" encoding="utf-8"?>
+<file path=ppt/notesSlides/notesSlide19.xml><?xml version="1.0" encoding="utf-8"?>
 <p:notes xmlns:a="http://schemas.openxmlformats.org/drawingml/2006/main" xmlns:r="http://schemas.openxmlformats.org/officeDocument/2006/relationships" xmlns:p="http://schemas.openxmlformats.org/presentationml/2006/main" showMasterSp="0" showMasterPhAnim="0">
   <p:cSld>
     <p:spTree>
@@ -14120,36 +14340,6 @@
           </a:p>
         </p:txBody>
       </p:sp>
-      <p:pic>
-        <p:nvPicPr>
-          <p:cNvPr id="3" name="תמונה 2">
-            <a:extLst>
-              <a:ext uri="{FF2B5EF4-FFF2-40B4-BE49-F238E27FC236}">
-                <a16:creationId xmlns:a16="http://schemas.microsoft.com/office/drawing/2014/main" id="{ADE5DCE9-5A0B-F120-8DA5-47215C7DB600}"/>
-              </a:ext>
-            </a:extLst>
-          </p:cNvPr>
-          <p:cNvPicPr>
-            <a:picLocks noChangeAspect="1"/>
-          </p:cNvPicPr>
-          <p:nvPr/>
-        </p:nvPicPr>
-        <p:blipFill>
-          <a:blip r:embed="rId3"/>
-          <a:stretch>
-            <a:fillRect/>
-          </a:stretch>
-        </p:blipFill>
-        <p:spPr>
-          <a:xfrm>
-            <a:off x="4068244" y="504537"/>
-            <a:ext cx="7798567" cy="5848925"/>
-          </a:xfrm>
-          <a:prstGeom prst="rect">
-            <a:avLst/>
-          </a:prstGeom>
-        </p:spPr>
-      </p:pic>
       <p:sp>
         <p:nvSpPr>
           <p:cNvPr id="268" name="Google Shape;268;p16"/>
@@ -14392,6 +14582,333 @@
           </p:txBody>
         </p:sp>
       </p:grpSp>
+      <p:pic>
+        <p:nvPicPr>
+          <p:cNvPr id="4" name="Picture 3">
+            <a:extLst>
+              <a:ext uri="{FF2B5EF4-FFF2-40B4-BE49-F238E27FC236}">
+                <a16:creationId xmlns:a16="http://schemas.microsoft.com/office/drawing/2014/main" id="{C0DF7B6A-EACF-4ED2-9F94-9DC152BA8266}"/>
+              </a:ext>
+            </a:extLst>
+          </p:cNvPr>
+          <p:cNvPicPr>
+            <a:picLocks noChangeAspect="1"/>
+          </p:cNvPicPr>
+          <p:nvPr/>
+        </p:nvPicPr>
+        <p:blipFill>
+          <a:blip r:embed="rId3"/>
+          <a:stretch>
+            <a:fillRect/>
+          </a:stretch>
+        </p:blipFill>
+        <p:spPr>
+          <a:xfrm>
+            <a:off x="3805188" y="211852"/>
+            <a:ext cx="7906031" cy="5980957"/>
+          </a:xfrm>
+          <a:prstGeom prst="rect">
+            <a:avLst/>
+          </a:prstGeom>
+        </p:spPr>
+      </p:pic>
+      <p:sp>
+        <p:nvSpPr>
+          <p:cNvPr id="11" name="Google Shape;266;p16">
+            <a:extLst>
+              <a:ext uri="{FF2B5EF4-FFF2-40B4-BE49-F238E27FC236}">
+                <a16:creationId xmlns:a16="http://schemas.microsoft.com/office/drawing/2014/main" id="{52A90EE1-90D4-4816-AA94-C0CB5FA9D2F0}"/>
+              </a:ext>
+            </a:extLst>
+          </p:cNvPr>
+          <p:cNvSpPr txBox="1">
+            <a:spLocks/>
+          </p:cNvSpPr>
+          <p:nvPr/>
+        </p:nvSpPr>
+        <p:spPr>
+          <a:xfrm>
+            <a:off x="2887409" y="305504"/>
+            <a:ext cx="3455821" cy="1371774"/>
+          </a:xfrm>
+          <a:prstGeom prst="rect">
+            <a:avLst/>
+          </a:prstGeom>
+          <a:noFill/>
+          <a:ln>
+            <a:noFill/>
+          </a:ln>
+        </p:spPr>
+        <p:txBody>
+          <a:bodyPr spcFirstLastPara="1" wrap="square" lIns="91425" tIns="45700" rIns="91425" bIns="45700" anchor="t" anchorCtr="0">
+            <a:normAutofit/>
+          </a:bodyPr>
+          <a:lstStyle>
+            <a:defPPr marR="0" lvl="0" algn="l" rtl="0">
+              <a:lnSpc>
+                <a:spcPct val="100000"/>
+              </a:lnSpc>
+              <a:spcBef>
+                <a:spcPts val="0"/>
+              </a:spcBef>
+              <a:spcAft>
+                <a:spcPts val="0"/>
+              </a:spcAft>
+            </a:defPPr>
+            <a:lvl1pPr marL="457200" marR="0" lvl="0" indent="-342900" algn="l" rtl="0">
+              <a:lnSpc>
+                <a:spcPct val="90000"/>
+              </a:lnSpc>
+              <a:spcBef>
+                <a:spcPts val="1000"/>
+              </a:spcBef>
+              <a:spcAft>
+                <a:spcPts val="0"/>
+              </a:spcAft>
+              <a:buClr>
+                <a:schemeClr val="dk1"/>
+              </a:buClr>
+              <a:buSzPts val="1800"/>
+              <a:buFont typeface="Arial"/>
+              <a:buChar char="•"/>
+              <a:defRPr sz="2800" b="0" i="0" u="none" strike="noStrike" cap="none">
+                <a:solidFill>
+                  <a:schemeClr val="dk1"/>
+                </a:solidFill>
+                <a:latin typeface="Calibri"/>
+                <a:ea typeface="Calibri"/>
+                <a:cs typeface="Calibri"/>
+                <a:sym typeface="Calibri"/>
+              </a:defRPr>
+            </a:lvl1pPr>
+            <a:lvl2pPr marL="914400" marR="0" lvl="1" indent="-342900" algn="l" rtl="0">
+              <a:lnSpc>
+                <a:spcPct val="90000"/>
+              </a:lnSpc>
+              <a:spcBef>
+                <a:spcPts val="500"/>
+              </a:spcBef>
+              <a:spcAft>
+                <a:spcPts val="0"/>
+              </a:spcAft>
+              <a:buClr>
+                <a:schemeClr val="dk1"/>
+              </a:buClr>
+              <a:buSzPts val="1800"/>
+              <a:buFont typeface="Arial"/>
+              <a:buChar char="•"/>
+              <a:defRPr sz="2400" b="0" i="0" u="none" strike="noStrike" cap="none">
+                <a:solidFill>
+                  <a:schemeClr val="dk1"/>
+                </a:solidFill>
+                <a:latin typeface="Calibri"/>
+                <a:ea typeface="Calibri"/>
+                <a:cs typeface="Calibri"/>
+                <a:sym typeface="Calibri"/>
+              </a:defRPr>
+            </a:lvl2pPr>
+            <a:lvl3pPr marL="1371600" marR="0" lvl="2" indent="-342900" algn="l" rtl="0">
+              <a:lnSpc>
+                <a:spcPct val="90000"/>
+              </a:lnSpc>
+              <a:spcBef>
+                <a:spcPts val="500"/>
+              </a:spcBef>
+              <a:spcAft>
+                <a:spcPts val="0"/>
+              </a:spcAft>
+              <a:buClr>
+                <a:schemeClr val="dk1"/>
+              </a:buClr>
+              <a:buSzPts val="1800"/>
+              <a:buFont typeface="Arial"/>
+              <a:buChar char="•"/>
+              <a:defRPr sz="2000" b="0" i="0" u="none" strike="noStrike" cap="none">
+                <a:solidFill>
+                  <a:schemeClr val="dk1"/>
+                </a:solidFill>
+                <a:latin typeface="Calibri"/>
+                <a:ea typeface="Calibri"/>
+                <a:cs typeface="Calibri"/>
+                <a:sym typeface="Calibri"/>
+              </a:defRPr>
+            </a:lvl3pPr>
+            <a:lvl4pPr marL="1828800" marR="0" lvl="3" indent="-342900" algn="l" rtl="0">
+              <a:lnSpc>
+                <a:spcPct val="90000"/>
+              </a:lnSpc>
+              <a:spcBef>
+                <a:spcPts val="500"/>
+              </a:spcBef>
+              <a:spcAft>
+                <a:spcPts val="0"/>
+              </a:spcAft>
+              <a:buClr>
+                <a:schemeClr val="dk1"/>
+              </a:buClr>
+              <a:buSzPts val="1800"/>
+              <a:buFont typeface="Arial"/>
+              <a:buChar char="•"/>
+              <a:defRPr sz="1800" b="0" i="0" u="none" strike="noStrike" cap="none">
+                <a:solidFill>
+                  <a:schemeClr val="dk1"/>
+                </a:solidFill>
+                <a:latin typeface="Calibri"/>
+                <a:ea typeface="Calibri"/>
+                <a:cs typeface="Calibri"/>
+                <a:sym typeface="Calibri"/>
+              </a:defRPr>
+            </a:lvl4pPr>
+            <a:lvl5pPr marL="2286000" marR="0" lvl="4" indent="-342900" algn="l" rtl="0">
+              <a:lnSpc>
+                <a:spcPct val="90000"/>
+              </a:lnSpc>
+              <a:spcBef>
+                <a:spcPts val="500"/>
+              </a:spcBef>
+              <a:spcAft>
+                <a:spcPts val="0"/>
+              </a:spcAft>
+              <a:buClr>
+                <a:schemeClr val="dk1"/>
+              </a:buClr>
+              <a:buSzPts val="1800"/>
+              <a:buFont typeface="Arial"/>
+              <a:buChar char="•"/>
+              <a:defRPr sz="1800" b="0" i="0" u="none" strike="noStrike" cap="none">
+                <a:solidFill>
+                  <a:schemeClr val="dk1"/>
+                </a:solidFill>
+                <a:latin typeface="Calibri"/>
+                <a:ea typeface="Calibri"/>
+                <a:cs typeface="Calibri"/>
+                <a:sym typeface="Calibri"/>
+              </a:defRPr>
+            </a:lvl5pPr>
+            <a:lvl6pPr marL="2743200" marR="0" lvl="5" indent="-342900" algn="l" rtl="0">
+              <a:lnSpc>
+                <a:spcPct val="90000"/>
+              </a:lnSpc>
+              <a:spcBef>
+                <a:spcPts val="500"/>
+              </a:spcBef>
+              <a:spcAft>
+                <a:spcPts val="0"/>
+              </a:spcAft>
+              <a:buClr>
+                <a:schemeClr val="dk1"/>
+              </a:buClr>
+              <a:buSzPts val="1800"/>
+              <a:buFont typeface="Arial"/>
+              <a:buChar char="•"/>
+              <a:defRPr sz="1800" b="0" i="0" u="none" strike="noStrike" cap="none">
+                <a:solidFill>
+                  <a:schemeClr val="dk1"/>
+                </a:solidFill>
+                <a:latin typeface="Calibri"/>
+                <a:ea typeface="Calibri"/>
+                <a:cs typeface="Calibri"/>
+                <a:sym typeface="Calibri"/>
+              </a:defRPr>
+            </a:lvl6pPr>
+            <a:lvl7pPr marL="3200400" marR="0" lvl="6" indent="-342900" algn="l" rtl="0">
+              <a:lnSpc>
+                <a:spcPct val="90000"/>
+              </a:lnSpc>
+              <a:spcBef>
+                <a:spcPts val="500"/>
+              </a:spcBef>
+              <a:spcAft>
+                <a:spcPts val="0"/>
+              </a:spcAft>
+              <a:buClr>
+                <a:schemeClr val="dk1"/>
+              </a:buClr>
+              <a:buSzPts val="1800"/>
+              <a:buFont typeface="Arial"/>
+              <a:buChar char="•"/>
+              <a:defRPr sz="1800" b="0" i="0" u="none" strike="noStrike" cap="none">
+                <a:solidFill>
+                  <a:schemeClr val="dk1"/>
+                </a:solidFill>
+                <a:latin typeface="Calibri"/>
+                <a:ea typeface="Calibri"/>
+                <a:cs typeface="Calibri"/>
+                <a:sym typeface="Calibri"/>
+              </a:defRPr>
+            </a:lvl7pPr>
+            <a:lvl8pPr marL="3657600" marR="0" lvl="7" indent="-342900" algn="l" rtl="0">
+              <a:lnSpc>
+                <a:spcPct val="90000"/>
+              </a:lnSpc>
+              <a:spcBef>
+                <a:spcPts val="500"/>
+              </a:spcBef>
+              <a:spcAft>
+                <a:spcPts val="0"/>
+              </a:spcAft>
+              <a:buClr>
+                <a:schemeClr val="dk1"/>
+              </a:buClr>
+              <a:buSzPts val="1800"/>
+              <a:buFont typeface="Arial"/>
+              <a:buChar char="•"/>
+              <a:defRPr sz="1800" b="0" i="0" u="none" strike="noStrike" cap="none">
+                <a:solidFill>
+                  <a:schemeClr val="dk1"/>
+                </a:solidFill>
+                <a:latin typeface="Calibri"/>
+                <a:ea typeface="Calibri"/>
+                <a:cs typeface="Calibri"/>
+                <a:sym typeface="Calibri"/>
+              </a:defRPr>
+            </a:lvl8pPr>
+            <a:lvl9pPr marL="4114800" marR="0" lvl="8" indent="-342900" algn="l" rtl="0">
+              <a:lnSpc>
+                <a:spcPct val="90000"/>
+              </a:lnSpc>
+              <a:spcBef>
+                <a:spcPts val="500"/>
+              </a:spcBef>
+              <a:spcAft>
+                <a:spcPts val="0"/>
+              </a:spcAft>
+              <a:buClr>
+                <a:schemeClr val="dk1"/>
+              </a:buClr>
+              <a:buSzPts val="1800"/>
+              <a:buFont typeface="Arial"/>
+              <a:buChar char="•"/>
+              <a:defRPr sz="1800" b="0" i="0" u="none" strike="noStrike" cap="none">
+                <a:solidFill>
+                  <a:schemeClr val="dk1"/>
+                </a:solidFill>
+                <a:latin typeface="Calibri"/>
+                <a:ea typeface="Calibri"/>
+                <a:cs typeface="Calibri"/>
+                <a:sym typeface="Calibri"/>
+              </a:defRPr>
+            </a:lvl9pPr>
+          </a:lstStyle>
+          <a:p>
+            <a:pPr marL="0" indent="0">
+              <a:spcBef>
+                <a:spcPts val="0"/>
+              </a:spcBef>
+              <a:spcAft>
+                <a:spcPts val="600"/>
+              </a:spcAft>
+              <a:buSzPts val="1600"/>
+              <a:buFont typeface="Arial"/>
+              <a:buNone/>
+            </a:pPr>
+            <a:r>
+              <a:rPr lang="en-US" sz="2000" b="1" dirty="0"/>
+              <a:t>Before</a:t>
+            </a:r>
+          </a:p>
+        </p:txBody>
+      </p:sp>
     </p:spTree>
   </p:cSld>
   <p:clrMapOvr>
@@ -14401,6 +14918,594 @@
 </file>
 
 <file path=ppt/slides/slide11.xml><?xml version="1.0" encoding="utf-8"?>
+<p:sld xmlns:a="http://schemas.openxmlformats.org/drawingml/2006/main" xmlns:r="http://schemas.openxmlformats.org/officeDocument/2006/relationships" xmlns:p="http://schemas.openxmlformats.org/presentationml/2006/main">
+  <p:cSld>
+    <p:spTree>
+      <p:nvGrpSpPr>
+        <p:cNvPr id="1" name="Shape 263"/>
+        <p:cNvGrpSpPr/>
+        <p:nvPr/>
+      </p:nvGrpSpPr>
+      <p:grpSpPr>
+        <a:xfrm>
+          <a:off x="0" y="0"/>
+          <a:ext cx="0" cy="0"/>
+          <a:chOff x="0" y="0"/>
+          <a:chExt cx="0" cy="0"/>
+        </a:xfrm>
+      </p:grpSpPr>
+      <p:sp>
+        <p:nvSpPr>
+          <p:cNvPr id="264" name="Google Shape;264;p16"/>
+          <p:cNvSpPr txBox="1">
+            <a:spLocks noGrp="1"/>
+          </p:cNvSpPr>
+          <p:nvPr>
+            <p:ph type="title"/>
+          </p:nvPr>
+        </p:nvSpPr>
+        <p:spPr>
+          <a:xfrm>
+            <a:off x="444661" y="665191"/>
+            <a:ext cx="3455821" cy="1616203"/>
+          </a:xfrm>
+          <a:prstGeom prst="rect">
+            <a:avLst/>
+          </a:prstGeom>
+        </p:spPr>
+        <p:txBody>
+          <a:bodyPr spcFirstLastPara="1" lIns="91425" tIns="45700" rIns="91425" bIns="45700" anchor="b" anchorCtr="0">
+            <a:normAutofit/>
+          </a:bodyPr>
+          <a:lstStyle/>
+          <a:p>
+            <a:pPr marL="0" lvl="0" indent="0" rtl="0">
+              <a:spcBef>
+                <a:spcPts val="0"/>
+              </a:spcBef>
+              <a:spcAft>
+                <a:spcPts val="0"/>
+              </a:spcAft>
+              <a:buClr>
+                <a:schemeClr val="dk1"/>
+              </a:buClr>
+              <a:buSzPts val="4400"/>
+              <a:buFont typeface="Calibri"/>
+              <a:buNone/>
+            </a:pPr>
+            <a:r>
+              <a:rPr lang="en-US" sz="3200" b="1" dirty="0"/>
+              <a:t>Handling Data Imbalance</a:t>
+            </a:r>
+          </a:p>
+        </p:txBody>
+      </p:sp>
+      <p:sp>
+        <p:nvSpPr>
+          <p:cNvPr id="266" name="Google Shape;266;p16"/>
+          <p:cNvSpPr txBox="1">
+            <a:spLocks noGrp="1"/>
+          </p:cNvSpPr>
+          <p:nvPr>
+            <p:ph type="body" idx="1"/>
+          </p:nvPr>
+        </p:nvSpPr>
+        <p:spPr>
+          <a:xfrm>
+            <a:off x="444661" y="2514426"/>
+            <a:ext cx="3455821" cy="1371774"/>
+          </a:xfrm>
+          <a:prstGeom prst="rect">
+            <a:avLst/>
+          </a:prstGeom>
+        </p:spPr>
+        <p:txBody>
+          <a:bodyPr spcFirstLastPara="1" lIns="91425" tIns="45700" rIns="91425" bIns="45700" anchor="t" anchorCtr="0">
+            <a:normAutofit/>
+          </a:bodyPr>
+          <a:lstStyle/>
+          <a:p>
+            <a:pPr marL="0" lvl="0" indent="0" rtl="0">
+              <a:spcBef>
+                <a:spcPts val="0"/>
+              </a:spcBef>
+              <a:spcAft>
+                <a:spcPts val="600"/>
+              </a:spcAft>
+              <a:buClr>
+                <a:schemeClr val="dk1"/>
+              </a:buClr>
+              <a:buSzPts val="1600"/>
+              <a:buNone/>
+            </a:pPr>
+            <a:r>
+              <a:rPr lang="en-US" sz="2000" dirty="0"/>
+              <a:t>Applied </a:t>
+            </a:r>
+            <a:r>
+              <a:rPr lang="en-US" sz="2000" b="1" dirty="0"/>
+              <a:t>oversampling</a:t>
+            </a:r>
+            <a:r>
+              <a:rPr lang="en-US" sz="2000" dirty="0"/>
+              <a:t> to the minority class (train set only)</a:t>
+            </a:r>
+            <a:br>
+              <a:rPr lang="en-US" sz="2000" dirty="0"/>
+            </a:br>
+            <a:r>
+              <a:rPr lang="en-US" sz="2000" dirty="0"/>
+              <a:t>Technique used: SMOTE</a:t>
+            </a:r>
+          </a:p>
+        </p:txBody>
+      </p:sp>
+      <p:pic>
+        <p:nvPicPr>
+          <p:cNvPr id="3" name="תמונה 2">
+            <a:extLst>
+              <a:ext uri="{FF2B5EF4-FFF2-40B4-BE49-F238E27FC236}">
+                <a16:creationId xmlns:a16="http://schemas.microsoft.com/office/drawing/2014/main" id="{ADE5DCE9-5A0B-F120-8DA5-47215C7DB600}"/>
+              </a:ext>
+            </a:extLst>
+          </p:cNvPr>
+          <p:cNvPicPr>
+            <a:picLocks noChangeAspect="1"/>
+          </p:cNvPicPr>
+          <p:nvPr/>
+        </p:nvPicPr>
+        <p:blipFill>
+          <a:blip r:embed="rId3"/>
+          <a:stretch>
+            <a:fillRect/>
+          </a:stretch>
+        </p:blipFill>
+        <p:spPr>
+          <a:xfrm>
+            <a:off x="4068244" y="504537"/>
+            <a:ext cx="7798567" cy="5848925"/>
+          </a:xfrm>
+          <a:prstGeom prst="rect">
+            <a:avLst/>
+          </a:prstGeom>
+        </p:spPr>
+      </p:pic>
+      <p:sp>
+        <p:nvSpPr>
+          <p:cNvPr id="268" name="Google Shape;268;p16"/>
+          <p:cNvSpPr txBox="1">
+            <a:spLocks noGrp="1"/>
+          </p:cNvSpPr>
+          <p:nvPr>
+            <p:ph type="sldNum" idx="12"/>
+          </p:nvPr>
+        </p:nvSpPr>
+        <p:spPr>
+          <a:xfrm>
+            <a:off x="8610600" y="6356350"/>
+            <a:ext cx="2743200" cy="365125"/>
+          </a:xfrm>
+          <a:prstGeom prst="rect">
+            <a:avLst/>
+          </a:prstGeom>
+        </p:spPr>
+        <p:txBody>
+          <a:bodyPr spcFirstLastPara="1" lIns="91425" tIns="45700" rIns="91425" bIns="45700" anchorCtr="0">
+            <a:normAutofit/>
+          </a:bodyPr>
+          <a:lstStyle/>
+          <a:p>
+            <a:pPr marL="0" lvl="0" indent="0" rtl="0">
+              <a:spcBef>
+                <a:spcPts val="0"/>
+              </a:spcBef>
+              <a:spcAft>
+                <a:spcPts val="600"/>
+              </a:spcAft>
+              <a:buNone/>
+            </a:pPr>
+            <a:fld id="{00000000-1234-1234-1234-123412341234}" type="slidenum">
+              <a:rPr lang="en-US">
+                <a:solidFill>
+                  <a:schemeClr val="tx1">
+                    <a:lumMod val="50000"/>
+                    <a:lumOff val="50000"/>
+                  </a:schemeClr>
+                </a:solidFill>
+              </a:rPr>
+              <a:pPr marL="0" lvl="0" indent="0" rtl="0">
+                <a:spcBef>
+                  <a:spcPts val="0"/>
+                </a:spcBef>
+                <a:spcAft>
+                  <a:spcPts val="600"/>
+                </a:spcAft>
+                <a:buNone/>
+              </a:pPr>
+              <a:t>11</a:t>
+            </a:fld>
+            <a:endParaRPr lang="en-US">
+              <a:solidFill>
+                <a:schemeClr val="tx1">
+                  <a:lumMod val="50000"/>
+                  <a:lumOff val="50000"/>
+                </a:schemeClr>
+              </a:solidFill>
+            </a:endParaRPr>
+          </a:p>
+        </p:txBody>
+      </p:sp>
+      <p:sp>
+        <p:nvSpPr>
+          <p:cNvPr id="14" name="TextBox 13">
+            <a:extLst>
+              <a:ext uri="{FF2B5EF4-FFF2-40B4-BE49-F238E27FC236}">
+                <a16:creationId xmlns:a16="http://schemas.microsoft.com/office/drawing/2014/main" id="{D2F792F3-E20A-4A79-B877-A3DD88599427}"/>
+              </a:ext>
+            </a:extLst>
+          </p:cNvPr>
+          <p:cNvSpPr txBox="1"/>
+          <p:nvPr/>
+        </p:nvSpPr>
+        <p:spPr>
+          <a:xfrm>
+            <a:off x="3449548" y="509859"/>
+            <a:ext cx="6097712" cy="400110"/>
+          </a:xfrm>
+          <a:prstGeom prst="rect">
+            <a:avLst/>
+          </a:prstGeom>
+          <a:noFill/>
+        </p:spPr>
+        <p:txBody>
+          <a:bodyPr wrap="square">
+            <a:spAutoFit/>
+          </a:bodyPr>
+          <a:lstStyle/>
+          <a:p>
+            <a:r>
+              <a:rPr lang="en-US" sz="2000" b="1" dirty="0">
+                <a:latin typeface="Calibri" panose="020F0502020204030204" pitchFamily="34" charset="0"/>
+                <a:ea typeface="Calibri" panose="020F0502020204030204" pitchFamily="34" charset="0"/>
+                <a:cs typeface="Calibri" panose="020F0502020204030204" pitchFamily="34" charset="0"/>
+              </a:rPr>
+              <a:t>After</a:t>
+            </a:r>
+          </a:p>
+        </p:txBody>
+      </p:sp>
+    </p:spTree>
+    <p:extLst>
+      <p:ext uri="{BB962C8B-B14F-4D97-AF65-F5344CB8AC3E}">
+        <p14:creationId xmlns:p14="http://schemas.microsoft.com/office/powerpoint/2010/main" val="3038585644"/>
+      </p:ext>
+    </p:extLst>
+  </p:cSld>
+  <p:clrMapOvr>
+    <a:masterClrMapping/>
+  </p:clrMapOvr>
+</p:sld>
+</file>
+
+<file path=ppt/slides/slide12.xml><?xml version="1.0" encoding="utf-8"?>
+<p:sld xmlns:a="http://schemas.openxmlformats.org/drawingml/2006/main" xmlns:r="http://schemas.openxmlformats.org/officeDocument/2006/relationships" xmlns:p="http://schemas.openxmlformats.org/presentationml/2006/main">
+  <p:cSld>
+    <p:bg>
+      <p:bgPr>
+        <a:solidFill>
+          <a:schemeClr val="bg1"/>
+        </a:solidFill>
+        <a:effectLst/>
+      </p:bgPr>
+    </p:bg>
+    <p:spTree>
+      <p:nvGrpSpPr>
+        <p:cNvPr id="1" name="Shape 118"/>
+        <p:cNvGrpSpPr/>
+        <p:nvPr/>
+      </p:nvGrpSpPr>
+      <p:grpSpPr>
+        <a:xfrm>
+          <a:off x="0" y="0"/>
+          <a:ext cx="0" cy="0"/>
+          <a:chOff x="0" y="0"/>
+          <a:chExt cx="0" cy="0"/>
+        </a:xfrm>
+      </p:grpSpPr>
+      <p:sp>
+        <p:nvSpPr>
+          <p:cNvPr id="131" name="Rectangle 130">
+            <a:extLst>
+              <a:ext uri="{FF2B5EF4-FFF2-40B4-BE49-F238E27FC236}">
+                <a16:creationId xmlns:a16="http://schemas.microsoft.com/office/drawing/2014/main" id="{6753252F-4873-4F63-801D-CC719279A7D5}"/>
+              </a:ext>
+              <a:ext uri="{C183D7F6-B498-43B3-948B-1728B52AA6E4}">
+                <adec:decorative xmlns:adec="http://schemas.microsoft.com/office/drawing/2017/decorative" val="1"/>
+              </a:ext>
+            </a:extLst>
+          </p:cNvPr>
+          <p:cNvSpPr>
+            <a:spLocks noGrp="1" noRot="1" noChangeAspect="1" noMove="1" noResize="1" noEditPoints="1" noAdjustHandles="1" noChangeArrowheads="1" noChangeShapeType="1" noTextEdit="1"/>
+          </p:cNvSpPr>
+          <p:nvPr>
+            <p:extLst>
+              <p:ext uri="{386F3935-93C4-4BCD-93E2-E3B085C9AB24}">
+                <p16:designElem xmlns:p16="http://schemas.microsoft.com/office/powerpoint/2015/main" val="1"/>
+              </p:ext>
+            </p:extLst>
+          </p:nvPr>
+        </p:nvSpPr>
+        <p:spPr>
+          <a:xfrm>
+            <a:off x="0" y="0"/>
+            <a:ext cx="12192000" cy="6858000"/>
+          </a:xfrm>
+          <a:prstGeom prst="rect">
+            <a:avLst/>
+          </a:prstGeom>
+          <a:solidFill>
+            <a:srgbClr val="FFFFFF"/>
+          </a:solidFill>
+          <a:ln>
+            <a:noFill/>
+          </a:ln>
+        </p:spPr>
+        <p:style>
+          <a:lnRef idx="2">
+            <a:schemeClr val="accent1">
+              <a:shade val="50000"/>
+            </a:schemeClr>
+          </a:lnRef>
+          <a:fillRef idx="1">
+            <a:schemeClr val="accent1"/>
+          </a:fillRef>
+          <a:effectRef idx="0">
+            <a:schemeClr val="accent1"/>
+          </a:effectRef>
+          <a:fontRef idx="minor">
+            <a:schemeClr val="lt1"/>
+          </a:fontRef>
+        </p:style>
+        <p:txBody>
+          <a:bodyPr rtlCol="0" anchor="ctr"/>
+          <a:lstStyle/>
+          <a:p>
+            <a:pPr algn="ctr"/>
+            <a:endParaRPr lang="en-US"/>
+          </a:p>
+        </p:txBody>
+      </p:sp>
+      <p:sp>
+        <p:nvSpPr>
+          <p:cNvPr id="133" name="Rectangle 132">
+            <a:extLst>
+              <a:ext uri="{FF2B5EF4-FFF2-40B4-BE49-F238E27FC236}">
+                <a16:creationId xmlns:a16="http://schemas.microsoft.com/office/drawing/2014/main" id="{047C8CCB-F95D-4249-92DD-651249D3535A}"/>
+              </a:ext>
+              <a:ext uri="{C183D7F6-B498-43B3-948B-1728B52AA6E4}">
+                <adec:decorative xmlns:adec="http://schemas.microsoft.com/office/drawing/2017/decorative" val="1"/>
+              </a:ext>
+            </a:extLst>
+          </p:cNvPr>
+          <p:cNvSpPr>
+            <a:spLocks noGrp="1" noRot="1" noChangeAspect="1" noMove="1" noResize="1" noEditPoints="1" noAdjustHandles="1" noChangeArrowheads="1" noChangeShapeType="1" noTextEdit="1"/>
+          </p:cNvSpPr>
+          <p:nvPr>
+            <p:extLst>
+              <p:ext uri="{386F3935-93C4-4BCD-93E2-E3B085C9AB24}">
+                <p16:designElem xmlns:p16="http://schemas.microsoft.com/office/powerpoint/2015/main" val="1"/>
+              </p:ext>
+            </p:extLst>
+          </p:nvPr>
+        </p:nvSpPr>
+        <p:spPr>
+          <a:xfrm>
+            <a:off x="0" y="0"/>
+            <a:ext cx="2013557" cy="6858000"/>
+          </a:xfrm>
+          <a:prstGeom prst="rect">
+            <a:avLst/>
+          </a:prstGeom>
+          <a:solidFill>
+            <a:srgbClr val="7F7F7F"/>
+          </a:solidFill>
+          <a:ln>
+            <a:noFill/>
+          </a:ln>
+        </p:spPr>
+        <p:style>
+          <a:lnRef idx="2">
+            <a:schemeClr val="accent1">
+              <a:shade val="50000"/>
+            </a:schemeClr>
+          </a:lnRef>
+          <a:fillRef idx="1">
+            <a:schemeClr val="accent1"/>
+          </a:fillRef>
+          <a:effectRef idx="0">
+            <a:schemeClr val="accent1"/>
+          </a:effectRef>
+          <a:fontRef idx="minor">
+            <a:schemeClr val="lt1"/>
+          </a:fontRef>
+        </p:style>
+        <p:txBody>
+          <a:bodyPr rtlCol="0" anchor="ctr"/>
+          <a:lstStyle/>
+          <a:p>
+            <a:pPr algn="ctr"/>
+            <a:endParaRPr lang="en-US"/>
+          </a:p>
+        </p:txBody>
+      </p:sp>
+      <p:sp>
+        <p:nvSpPr>
+          <p:cNvPr id="119" name="Google Shape;119;p4"/>
+          <p:cNvSpPr txBox="1">
+            <a:spLocks noGrp="1"/>
+          </p:cNvSpPr>
+          <p:nvPr>
+            <p:ph type="title"/>
+          </p:nvPr>
+        </p:nvSpPr>
+        <p:spPr>
+          <a:xfrm>
+            <a:off x="373380" y="2074363"/>
+            <a:ext cx="2752354" cy="2709275"/>
+          </a:xfrm>
+          <a:prstGeom prst="ellipse">
+            <a:avLst/>
+          </a:prstGeom>
+          <a:solidFill>
+            <a:srgbClr val="262626"/>
+          </a:solidFill>
+          <a:ln w="174625" cmpd="thinThick">
+            <a:solidFill>
+              <a:srgbClr val="262626"/>
+            </a:solidFill>
+          </a:ln>
+        </p:spPr>
+        <p:txBody>
+          <a:bodyPr spcFirstLastPara="1" vert="horz" lIns="91440" tIns="45720" rIns="91440" bIns="45720" rtlCol="0" anchor="ctr" anchorCtr="0">
+            <a:normAutofit/>
+          </a:bodyPr>
+          <a:lstStyle/>
+          <a:p>
+            <a:pPr marL="0" lvl="0" indent="0" algn="ctr">
+              <a:spcBef>
+                <a:spcPct val="0"/>
+              </a:spcBef>
+              <a:spcAft>
+                <a:spcPts val="0"/>
+              </a:spcAft>
+              <a:buClr>
+                <a:schemeClr val="dk1"/>
+              </a:buClr>
+              <a:buSzPts val="4400"/>
+            </a:pPr>
+            <a:r>
+              <a:rPr lang="en-US" sz="2400" b="1" kern="1200" dirty="0">
+                <a:solidFill>
+                  <a:srgbClr val="FFFFFF"/>
+                </a:solidFill>
+                <a:latin typeface="+mj-lt"/>
+                <a:ea typeface="+mj-ea"/>
+                <a:cs typeface="+mj-cs"/>
+              </a:rPr>
+              <a:t>Confusion Matrix</a:t>
+            </a:r>
+          </a:p>
+        </p:txBody>
+      </p:sp>
+      <p:sp>
+        <p:nvSpPr>
+          <p:cNvPr id="121" name="Google Shape;121;p4"/>
+          <p:cNvSpPr txBox="1">
+            <a:spLocks noGrp="1"/>
+          </p:cNvSpPr>
+          <p:nvPr>
+            <p:ph type="sldNum" idx="12"/>
+          </p:nvPr>
+        </p:nvSpPr>
+        <p:spPr>
+          <a:xfrm>
+            <a:off x="11310257" y="6356350"/>
+            <a:ext cx="560009" cy="365125"/>
+          </a:xfrm>
+          <a:prstGeom prst="rect">
+            <a:avLst/>
+          </a:prstGeom>
+        </p:spPr>
+        <p:txBody>
+          <a:bodyPr spcFirstLastPara="1" vert="horz" lIns="91440" tIns="45720" rIns="91440" bIns="45720" rtlCol="0" anchor="ctr" anchorCtr="0">
+            <a:normAutofit/>
+          </a:bodyPr>
+          <a:lstStyle/>
+          <a:p>
+            <a:pPr lvl="0" indent="0">
+              <a:spcBef>
+                <a:spcPts val="0"/>
+              </a:spcBef>
+              <a:spcAft>
+                <a:spcPts val="600"/>
+              </a:spcAft>
+              <a:buNone/>
+            </a:pPr>
+            <a:fld id="{00000000-1234-1234-1234-123412341234}" type="slidenum">
+              <a:rPr lang="en-US" kern="1200">
+                <a:solidFill>
+                  <a:srgbClr val="898989"/>
+                </a:solidFill>
+                <a:latin typeface="+mn-lt"/>
+                <a:ea typeface="+mn-ea"/>
+                <a:cs typeface="+mn-cs"/>
+              </a:rPr>
+              <a:pPr lvl="0" indent="0">
+                <a:spcBef>
+                  <a:spcPts val="0"/>
+                </a:spcBef>
+                <a:spcAft>
+                  <a:spcPts val="600"/>
+                </a:spcAft>
+                <a:buNone/>
+              </a:pPr>
+              <a:t>12</a:t>
+            </a:fld>
+            <a:endParaRPr lang="en-US" kern="1200">
+              <a:solidFill>
+                <a:srgbClr val="898989"/>
+              </a:solidFill>
+              <a:latin typeface="+mn-lt"/>
+              <a:ea typeface="+mn-ea"/>
+              <a:cs typeface="+mn-cs"/>
+            </a:endParaRPr>
+          </a:p>
+        </p:txBody>
+      </p:sp>
+      <p:pic>
+        <p:nvPicPr>
+          <p:cNvPr id="5" name="Picture 4">
+            <a:extLst>
+              <a:ext uri="{FF2B5EF4-FFF2-40B4-BE49-F238E27FC236}">
+                <a16:creationId xmlns:a16="http://schemas.microsoft.com/office/drawing/2014/main" id="{16393848-14E5-4C69-9AFF-F2F5EC8BB112}"/>
+              </a:ext>
+            </a:extLst>
+          </p:cNvPr>
+          <p:cNvPicPr>
+            <a:picLocks noChangeAspect="1"/>
+          </p:cNvPicPr>
+          <p:nvPr/>
+        </p:nvPicPr>
+        <p:blipFill>
+          <a:blip r:embed="rId3"/>
+          <a:stretch>
+            <a:fillRect/>
+          </a:stretch>
+        </p:blipFill>
+        <p:spPr>
+          <a:xfrm>
+            <a:off x="3499114" y="472611"/>
+            <a:ext cx="8723313" cy="6858000"/>
+          </a:xfrm>
+          <a:prstGeom prst="rect">
+            <a:avLst/>
+          </a:prstGeom>
+        </p:spPr>
+      </p:pic>
+    </p:spTree>
+    <p:extLst>
+      <p:ext uri="{BB962C8B-B14F-4D97-AF65-F5344CB8AC3E}">
+        <p14:creationId xmlns:p14="http://schemas.microsoft.com/office/powerpoint/2010/main" val="3909890638"/>
+      </p:ext>
+    </p:extLst>
+  </p:cSld>
+  <p:clrMapOvr>
+    <a:masterClrMapping/>
+  </p:clrMapOvr>
+</p:sld>
+</file>
+
+<file path=ppt/slides/slide13.xml><?xml version="1.0" encoding="utf-8"?>
 <p:sld xmlns:a="http://schemas.openxmlformats.org/drawingml/2006/main" xmlns:r="http://schemas.openxmlformats.org/officeDocument/2006/relationships" xmlns:p="http://schemas.openxmlformats.org/presentationml/2006/main">
   <p:cSld>
     <p:bg>
@@ -14691,7 +15796,7 @@
                 </a:spcAft>
                 <a:buNone/>
               </a:pPr>
-              <a:t>11</a:t>
+              <a:t>13</a:t>
             </a:fld>
             <a:endParaRPr lang="en-US" kern="1200">
               <a:solidFill>
@@ -15347,6 +16452,114 @@
           </a:p>
         </p:txBody>
       </p:sp>
+      <p:sp>
+        <p:nvSpPr>
+          <p:cNvPr id="15" name="Rectangle 14">
+            <a:extLst>
+              <a:ext uri="{FF2B5EF4-FFF2-40B4-BE49-F238E27FC236}">
+                <a16:creationId xmlns:a16="http://schemas.microsoft.com/office/drawing/2014/main" id="{C57EBDD3-D8BC-4A56-A81D-BF05E25CE032}"/>
+              </a:ext>
+            </a:extLst>
+          </p:cNvPr>
+          <p:cNvSpPr/>
+          <p:nvPr/>
+        </p:nvSpPr>
+        <p:spPr>
+          <a:xfrm>
+            <a:off x="6013970" y="4119936"/>
+            <a:ext cx="921251" cy="472612"/>
+          </a:xfrm>
+          <a:prstGeom prst="rect">
+            <a:avLst/>
+          </a:prstGeom>
+          <a:solidFill>
+            <a:srgbClr val="38A117">
+              <a:alpha val="40000"/>
+            </a:srgbClr>
+          </a:solidFill>
+          <a:ln>
+            <a:noFill/>
+          </a:ln>
+        </p:spPr>
+        <p:style>
+          <a:lnRef idx="2">
+            <a:schemeClr val="accent1">
+              <a:shade val="50000"/>
+            </a:schemeClr>
+          </a:lnRef>
+          <a:fillRef idx="1">
+            <a:schemeClr val="accent1"/>
+          </a:fillRef>
+          <a:effectRef idx="0">
+            <a:schemeClr val="accent1"/>
+          </a:effectRef>
+          <a:fontRef idx="minor">
+            <a:schemeClr val="lt1"/>
+          </a:fontRef>
+        </p:style>
+        <p:txBody>
+          <a:bodyPr rtlCol="0" anchor="ctr"/>
+          <a:lstStyle/>
+          <a:p>
+            <a:pPr algn="ctr"/>
+            <a:endParaRPr lang="en-IL"/>
+          </a:p>
+        </p:txBody>
+      </p:sp>
+      <p:sp>
+        <p:nvSpPr>
+          <p:cNvPr id="16" name="Rectangle 15">
+            <a:extLst>
+              <a:ext uri="{FF2B5EF4-FFF2-40B4-BE49-F238E27FC236}">
+                <a16:creationId xmlns:a16="http://schemas.microsoft.com/office/drawing/2014/main" id="{9369A3C3-6103-4BC0-A998-67E1E6203B53}"/>
+              </a:ext>
+            </a:extLst>
+          </p:cNvPr>
+          <p:cNvSpPr/>
+          <p:nvPr/>
+        </p:nvSpPr>
+        <p:spPr>
+          <a:xfrm>
+            <a:off x="8336493" y="2787008"/>
+            <a:ext cx="921251" cy="472612"/>
+          </a:xfrm>
+          <a:prstGeom prst="rect">
+            <a:avLst/>
+          </a:prstGeom>
+          <a:solidFill>
+            <a:srgbClr val="38A117">
+              <a:alpha val="40000"/>
+            </a:srgbClr>
+          </a:solidFill>
+          <a:ln>
+            <a:noFill/>
+          </a:ln>
+        </p:spPr>
+        <p:style>
+          <a:lnRef idx="2">
+            <a:schemeClr val="accent1">
+              <a:shade val="50000"/>
+            </a:schemeClr>
+          </a:lnRef>
+          <a:fillRef idx="1">
+            <a:schemeClr val="accent1"/>
+          </a:fillRef>
+          <a:effectRef idx="0">
+            <a:schemeClr val="accent1"/>
+          </a:effectRef>
+          <a:fontRef idx="minor">
+            <a:schemeClr val="lt1"/>
+          </a:fontRef>
+        </p:style>
+        <p:txBody>
+          <a:bodyPr rtlCol="0" anchor="ctr"/>
+          <a:lstStyle/>
+          <a:p>
+            <a:pPr algn="ctr"/>
+            <a:endParaRPr lang="en-IL"/>
+          </a:p>
+        </p:txBody>
+      </p:sp>
     </p:spTree>
     <p:extLst>
       <p:ext uri="{BB962C8B-B14F-4D97-AF65-F5344CB8AC3E}">
@@ -15360,7 +16573,7 @@
 </p:sld>
 </file>
 
-<file path=ppt/slides/slide12.xml><?xml version="1.0" encoding="utf-8"?>
+<file path=ppt/slides/slide14.xml><?xml version="1.0" encoding="utf-8"?>
 <p:sld xmlns:a="http://schemas.openxmlformats.org/drawingml/2006/main" xmlns:r="http://schemas.openxmlformats.org/officeDocument/2006/relationships" xmlns:p="http://schemas.openxmlformats.org/presentationml/2006/main">
   <p:cSld>
     <p:bg>
@@ -15694,7 +16907,7 @@
                 </a:spcAft>
                 <a:buNone/>
               </a:pPr>
-              <a:t>12</a:t>
+              <a:t>14</a:t>
             </a:fld>
             <a:endParaRPr lang="en-US" kern="1200">
               <a:solidFill>
@@ -15996,6 +17209,330 @@
           </a:p>
         </p:txBody>
       </p:sp>
+      <p:sp>
+        <p:nvSpPr>
+          <p:cNvPr id="8" name="Rectangle 7">
+            <a:extLst>
+              <a:ext uri="{FF2B5EF4-FFF2-40B4-BE49-F238E27FC236}">
+                <a16:creationId xmlns:a16="http://schemas.microsoft.com/office/drawing/2014/main" id="{719F8107-70BE-4F04-84A1-D60BA5BF3A4B}"/>
+              </a:ext>
+            </a:extLst>
+          </p:cNvPr>
+          <p:cNvSpPr/>
+          <p:nvPr/>
+        </p:nvSpPr>
+        <p:spPr>
+          <a:xfrm>
+            <a:off x="7204807" y="4163763"/>
+            <a:ext cx="921251" cy="472612"/>
+          </a:xfrm>
+          <a:prstGeom prst="rect">
+            <a:avLst/>
+          </a:prstGeom>
+          <a:solidFill>
+            <a:srgbClr val="38A117">
+              <a:alpha val="40000"/>
+            </a:srgbClr>
+          </a:solidFill>
+          <a:ln>
+            <a:noFill/>
+          </a:ln>
+        </p:spPr>
+        <p:style>
+          <a:lnRef idx="2">
+            <a:schemeClr val="accent1">
+              <a:shade val="50000"/>
+            </a:schemeClr>
+          </a:lnRef>
+          <a:fillRef idx="1">
+            <a:schemeClr val="accent1"/>
+          </a:fillRef>
+          <a:effectRef idx="0">
+            <a:schemeClr val="accent1"/>
+          </a:effectRef>
+          <a:fontRef idx="minor">
+            <a:schemeClr val="lt1"/>
+          </a:fontRef>
+        </p:style>
+        <p:txBody>
+          <a:bodyPr rtlCol="0" anchor="ctr"/>
+          <a:lstStyle/>
+          <a:p>
+            <a:pPr algn="ctr"/>
+            <a:endParaRPr lang="en-IL"/>
+          </a:p>
+        </p:txBody>
+      </p:sp>
+      <p:sp>
+        <p:nvSpPr>
+          <p:cNvPr id="9" name="Rectangle 8">
+            <a:extLst>
+              <a:ext uri="{FF2B5EF4-FFF2-40B4-BE49-F238E27FC236}">
+                <a16:creationId xmlns:a16="http://schemas.microsoft.com/office/drawing/2014/main" id="{086CF8F5-DE6D-425C-B619-BCF7DB9A7E16}"/>
+              </a:ext>
+            </a:extLst>
+          </p:cNvPr>
+          <p:cNvSpPr/>
+          <p:nvPr/>
+        </p:nvSpPr>
+        <p:spPr>
+          <a:xfrm>
+            <a:off x="9433565" y="4632761"/>
+            <a:ext cx="921251" cy="472612"/>
+          </a:xfrm>
+          <a:prstGeom prst="rect">
+            <a:avLst/>
+          </a:prstGeom>
+          <a:solidFill>
+            <a:srgbClr val="38A117">
+              <a:alpha val="40000"/>
+            </a:srgbClr>
+          </a:solidFill>
+          <a:ln>
+            <a:noFill/>
+          </a:ln>
+        </p:spPr>
+        <p:style>
+          <a:lnRef idx="2">
+            <a:schemeClr val="accent1">
+              <a:shade val="50000"/>
+            </a:schemeClr>
+          </a:lnRef>
+          <a:fillRef idx="1">
+            <a:schemeClr val="accent1"/>
+          </a:fillRef>
+          <a:effectRef idx="0">
+            <a:schemeClr val="accent1"/>
+          </a:effectRef>
+          <a:fontRef idx="minor">
+            <a:schemeClr val="lt1"/>
+          </a:fontRef>
+        </p:style>
+        <p:txBody>
+          <a:bodyPr rtlCol="0" anchor="ctr"/>
+          <a:lstStyle/>
+          <a:p>
+            <a:pPr algn="ctr"/>
+            <a:endParaRPr lang="en-IL"/>
+          </a:p>
+        </p:txBody>
+      </p:sp>
+      <p:sp>
+        <p:nvSpPr>
+          <p:cNvPr id="10" name="Rectangle 9">
+            <a:extLst>
+              <a:ext uri="{FF2B5EF4-FFF2-40B4-BE49-F238E27FC236}">
+                <a16:creationId xmlns:a16="http://schemas.microsoft.com/office/drawing/2014/main" id="{157F30C9-6444-43CE-B4FD-74A8972C3D06}"/>
+              </a:ext>
+            </a:extLst>
+          </p:cNvPr>
+          <p:cNvSpPr/>
+          <p:nvPr/>
+        </p:nvSpPr>
+        <p:spPr>
+          <a:xfrm>
+            <a:off x="9429495" y="4163763"/>
+            <a:ext cx="921251" cy="472612"/>
+          </a:xfrm>
+          <a:prstGeom prst="rect">
+            <a:avLst/>
+          </a:prstGeom>
+          <a:solidFill>
+            <a:srgbClr val="38A117">
+              <a:alpha val="40000"/>
+            </a:srgbClr>
+          </a:solidFill>
+          <a:ln>
+            <a:noFill/>
+          </a:ln>
+        </p:spPr>
+        <p:style>
+          <a:lnRef idx="2">
+            <a:schemeClr val="accent1">
+              <a:shade val="50000"/>
+            </a:schemeClr>
+          </a:lnRef>
+          <a:fillRef idx="1">
+            <a:schemeClr val="accent1"/>
+          </a:fillRef>
+          <a:effectRef idx="0">
+            <a:schemeClr val="accent1"/>
+          </a:effectRef>
+          <a:fontRef idx="minor">
+            <a:schemeClr val="lt1"/>
+          </a:fontRef>
+        </p:style>
+        <p:txBody>
+          <a:bodyPr rtlCol="0" anchor="ctr"/>
+          <a:lstStyle/>
+          <a:p>
+            <a:pPr algn="ctr"/>
+            <a:endParaRPr lang="en-IL"/>
+          </a:p>
+        </p:txBody>
+      </p:sp>
+      <p:sp>
+        <p:nvSpPr>
+          <p:cNvPr id="11" name="Rectangle 10">
+            <a:extLst>
+              <a:ext uri="{FF2B5EF4-FFF2-40B4-BE49-F238E27FC236}">
+                <a16:creationId xmlns:a16="http://schemas.microsoft.com/office/drawing/2014/main" id="{1A1083BC-AEA5-4768-8A73-514C51DCA1D6}"/>
+              </a:ext>
+            </a:extLst>
+          </p:cNvPr>
+          <p:cNvSpPr/>
+          <p:nvPr/>
+        </p:nvSpPr>
+        <p:spPr>
+          <a:xfrm>
+            <a:off x="10580905" y="5101759"/>
+            <a:ext cx="921251" cy="472612"/>
+          </a:xfrm>
+          <a:prstGeom prst="rect">
+            <a:avLst/>
+          </a:prstGeom>
+          <a:solidFill>
+            <a:srgbClr val="38A117">
+              <a:alpha val="40000"/>
+            </a:srgbClr>
+          </a:solidFill>
+          <a:ln>
+            <a:noFill/>
+          </a:ln>
+        </p:spPr>
+        <p:style>
+          <a:lnRef idx="2">
+            <a:schemeClr val="accent1">
+              <a:shade val="50000"/>
+            </a:schemeClr>
+          </a:lnRef>
+          <a:fillRef idx="1">
+            <a:schemeClr val="accent1"/>
+          </a:fillRef>
+          <a:effectRef idx="0">
+            <a:schemeClr val="accent1"/>
+          </a:effectRef>
+          <a:fontRef idx="minor">
+            <a:schemeClr val="lt1"/>
+          </a:fontRef>
+        </p:style>
+        <p:txBody>
+          <a:bodyPr rtlCol="0" anchor="ctr"/>
+          <a:lstStyle/>
+          <a:p>
+            <a:pPr algn="ctr"/>
+            <a:endParaRPr lang="en-IL"/>
+          </a:p>
+        </p:txBody>
+      </p:sp>
+      <p:sp>
+        <p:nvSpPr>
+          <p:cNvPr id="12" name="Rectangle 11">
+            <a:extLst>
+              <a:ext uri="{FF2B5EF4-FFF2-40B4-BE49-F238E27FC236}">
+                <a16:creationId xmlns:a16="http://schemas.microsoft.com/office/drawing/2014/main" id="{77FF59EA-808A-4E3B-8EC3-B99339C9D64C}"/>
+              </a:ext>
+            </a:extLst>
+          </p:cNvPr>
+          <p:cNvSpPr/>
+          <p:nvPr/>
+        </p:nvSpPr>
+        <p:spPr>
+          <a:xfrm>
+            <a:off x="6090428" y="4163763"/>
+            <a:ext cx="921251" cy="472612"/>
+          </a:xfrm>
+          <a:prstGeom prst="rect">
+            <a:avLst/>
+          </a:prstGeom>
+          <a:solidFill>
+            <a:srgbClr val="38A117">
+              <a:alpha val="40000"/>
+            </a:srgbClr>
+          </a:solidFill>
+          <a:ln>
+            <a:noFill/>
+          </a:ln>
+        </p:spPr>
+        <p:style>
+          <a:lnRef idx="2">
+            <a:schemeClr val="accent1">
+              <a:shade val="50000"/>
+            </a:schemeClr>
+          </a:lnRef>
+          <a:fillRef idx="1">
+            <a:schemeClr val="accent1"/>
+          </a:fillRef>
+          <a:effectRef idx="0">
+            <a:schemeClr val="accent1"/>
+          </a:effectRef>
+          <a:fontRef idx="minor">
+            <a:schemeClr val="lt1"/>
+          </a:fontRef>
+        </p:style>
+        <p:txBody>
+          <a:bodyPr rtlCol="0" anchor="ctr"/>
+          <a:lstStyle/>
+          <a:p>
+            <a:pPr algn="ctr"/>
+            <a:endParaRPr lang="en-IL"/>
+          </a:p>
+        </p:txBody>
+      </p:sp>
+      <p:sp>
+        <p:nvSpPr>
+          <p:cNvPr id="13" name="Rectangle 12">
+            <a:extLst>
+              <a:ext uri="{FF2B5EF4-FFF2-40B4-BE49-F238E27FC236}">
+                <a16:creationId xmlns:a16="http://schemas.microsoft.com/office/drawing/2014/main" id="{C6677530-9A56-4174-BDAD-E770BD478653}"/>
+              </a:ext>
+            </a:extLst>
+          </p:cNvPr>
+          <p:cNvSpPr/>
+          <p:nvPr/>
+        </p:nvSpPr>
+        <p:spPr>
+          <a:xfrm>
+            <a:off x="8324758" y="5074551"/>
+            <a:ext cx="921251" cy="472612"/>
+          </a:xfrm>
+          <a:prstGeom prst="rect">
+            <a:avLst/>
+          </a:prstGeom>
+          <a:solidFill>
+            <a:srgbClr val="38A117">
+              <a:alpha val="40000"/>
+            </a:srgbClr>
+          </a:solidFill>
+          <a:ln>
+            <a:noFill/>
+          </a:ln>
+        </p:spPr>
+        <p:style>
+          <a:lnRef idx="2">
+            <a:schemeClr val="accent1">
+              <a:shade val="50000"/>
+            </a:schemeClr>
+          </a:lnRef>
+          <a:fillRef idx="1">
+            <a:schemeClr val="accent1"/>
+          </a:fillRef>
+          <a:effectRef idx="0">
+            <a:schemeClr val="accent1"/>
+          </a:effectRef>
+          <a:fontRef idx="minor">
+            <a:schemeClr val="lt1"/>
+          </a:fontRef>
+        </p:style>
+        <p:txBody>
+          <a:bodyPr rtlCol="0" anchor="ctr"/>
+          <a:lstStyle/>
+          <a:p>
+            <a:pPr algn="ctr"/>
+            <a:endParaRPr lang="en-IL"/>
+          </a:p>
+        </p:txBody>
+      </p:sp>
     </p:spTree>
     <p:extLst>
       <p:ext uri="{BB962C8B-B14F-4D97-AF65-F5344CB8AC3E}">
@@ -16009,7 +17546,7 @@
 </p:sld>
 </file>
 
-<file path=ppt/slides/slide13.xml><?xml version="1.0" encoding="utf-8"?>
+<file path=ppt/slides/slide15.xml><?xml version="1.0" encoding="utf-8"?>
 <p:sld xmlns:a="http://schemas.openxmlformats.org/drawingml/2006/main" xmlns:r="http://schemas.openxmlformats.org/officeDocument/2006/relationships" xmlns:p="http://schemas.openxmlformats.org/presentationml/2006/main">
   <p:cSld>
     <p:bg>
@@ -16301,7 +17838,7 @@
                 </a:spcAft>
                 <a:buNone/>
               </a:pPr>
-              <a:t>13</a:t>
+              <a:t>15</a:t>
             </a:fld>
             <a:endParaRPr lang="en-US" kern="1200">
               <a:solidFill>
@@ -16327,7 +17864,7 @@
 </p:sld>
 </file>
 
-<file path=ppt/slides/slide14.xml><?xml version="1.0" encoding="utf-8"?>
+<file path=ppt/slides/slide16.xml><?xml version="1.0" encoding="utf-8"?>
 <p:sld xmlns:a="http://schemas.openxmlformats.org/drawingml/2006/main" xmlns:r="http://schemas.openxmlformats.org/officeDocument/2006/relationships" xmlns:p="http://schemas.openxmlformats.org/presentationml/2006/main">
   <p:cSld>
     <p:spTree>
@@ -16438,7 +17975,7 @@
             </a:pPr>
             <a:fld id="{00000000-1234-1234-1234-123412341234}" type="slidenum">
               <a:rPr lang="en-US"/>
-              <a:t>14</a:t>
+              <a:t>16</a:t>
             </a:fld>
             <a:endParaRPr/>
           </a:p>
@@ -16487,7 +18024,7 @@
 </p:sld>
 </file>
 
-<file path=ppt/slides/slide15.xml><?xml version="1.0" encoding="utf-8"?>
+<file path=ppt/slides/slide17.xml><?xml version="1.0" encoding="utf-8"?>
 <p:sld xmlns:a="http://schemas.openxmlformats.org/drawingml/2006/main" xmlns:r="http://schemas.openxmlformats.org/officeDocument/2006/relationships" xmlns:p="http://schemas.openxmlformats.org/presentationml/2006/main">
   <p:cSld>
     <p:spTree>
@@ -16598,7 +18135,7 @@
             </a:pPr>
             <a:fld id="{00000000-1234-1234-1234-123412341234}" type="slidenum">
               <a:rPr lang="en-US"/>
-              <a:t>15</a:t>
+              <a:t>17</a:t>
             </a:fld>
             <a:endParaRPr/>
           </a:p>
@@ -17360,7 +18897,7 @@
 </p:sld>
 </file>
 
-<file path=ppt/slides/slide16.xml><?xml version="1.0" encoding="utf-8"?>
+<file path=ppt/slides/slide18.xml><?xml version="1.0" encoding="utf-8"?>
 <p:sld xmlns:a="http://schemas.openxmlformats.org/drawingml/2006/main" xmlns:r="http://schemas.openxmlformats.org/officeDocument/2006/relationships" xmlns:p="http://schemas.openxmlformats.org/presentationml/2006/main">
   <p:cSld>
     <p:spTree>
@@ -17613,7 +19150,7 @@
             </a:pPr>
             <a:fld id="{00000000-1234-1234-1234-123412341234}" type="slidenum">
               <a:rPr lang="en-US"/>
-              <a:t>16</a:t>
+              <a:t>18</a:t>
             </a:fld>
             <a:endParaRPr/>
           </a:p>
@@ -17627,7 +19164,7 @@
 </p:sld>
 </file>
 
-<file path=ppt/slides/slide17.xml><?xml version="1.0" encoding="utf-8"?>
+<file path=ppt/slides/slide19.xml><?xml version="1.0" encoding="utf-8"?>
 <p:sld xmlns:a="http://schemas.openxmlformats.org/drawingml/2006/main" xmlns:r="http://schemas.openxmlformats.org/officeDocument/2006/relationships" xmlns:p="http://schemas.openxmlformats.org/presentationml/2006/main">
   <p:cSld>
     <p:spTree>
@@ -17862,7 +19399,7 @@
             </a:pPr>
             <a:fld id="{00000000-1234-1234-1234-123412341234}" type="slidenum">
               <a:rPr lang="en-US"/>
-              <a:t>17</a:t>
+              <a:t>19</a:t>
             </a:fld>
             <a:endParaRPr/>
           </a:p>

</xml_diff>